<commit_message>
Poster done for the most part
Waiting for final review and logo if necessary.
</commit_message>
<xml_diff>
--- a/poster/Poster.pptx
+++ b/poster/Poster.pptx
@@ -1297,8 +1297,8 @@
         </p:nvSpPr>
         <p:spPr>
           <a:xfrm>
-            <a:off x="32450409" y="17669577"/>
-            <a:ext cx="10808741" cy="10274572"/>
+            <a:off x="32450409" y="17512976"/>
+            <a:ext cx="10808741" cy="10303314"/>
           </a:xfrm>
           <a:prstGeom prst="roundRect">
             <a:avLst>
@@ -1357,7 +1357,7 @@
         </p:nvSpPr>
         <p:spPr>
           <a:xfrm>
-            <a:off x="32771826" y="18725911"/>
+            <a:off x="32771826" y="18569310"/>
             <a:ext cx="10226840" cy="9140964"/>
           </a:xfrm>
           <a:prstGeom prst="rect">
@@ -1380,7 +1380,7 @@
               <a:rPr lang="en-US" sz="2800" dirty="0">
                 <a:latin typeface="Domine" panose="020B0604020202020204" charset="0"/>
               </a:rPr>
-              <a:t>The study is now focusing on the numerical interpretation of the optical illusion. This new task is approached with machine learning models. Machine learning models differ from physics implementation script in that they are not given an explicit method to use, but they “learn” their own optimal function for their given task. </a:t>
+              <a:t>The study is now focusing on the numerical interpretation of the optical illusion. This new task is approached with machine learning models. Machine learning models differ from physics implementation scripts in that they are not given an explicit method to use, but they “learn” their own optimal function for their given task. </a:t>
             </a:r>
           </a:p>
           <a:p>
@@ -1398,7 +1398,7 @@
               <a:rPr lang="en-US" sz="2800" dirty="0">
                 <a:latin typeface="Domine" panose="020B0604020202020204" charset="0"/>
               </a:rPr>
-              <a:t>Using the existing simulation scripts, machine learning models are currently being trained to imitate how a human batter would react to a pitch. </a:t>
+              <a:t>Using the existing simulation scripts, machine learning models are trained to imitate how a human batter would react to a pitch. </a:t>
             </a:r>
           </a:p>
           <a:p>
@@ -1422,7 +1422,7 @@
               <a:rPr lang="en-US" sz="2800" dirty="0">
                 <a:latin typeface="Domine" panose="020B0604020202020204" charset="0"/>
               </a:rPr>
-              <a:t>Curveballs would given to a model that is not anticipating a curveball. A model that is trained heavily on fastballs would be a good example.</a:t>
+              <a:t>Curveballs would be given to a model that is not anticipating a curveball. A model that is trained heavily on fastballs would be a good example.</a:t>
             </a:r>
           </a:p>
           <a:p>
@@ -1434,7 +1434,7 @@
               <a:rPr lang="en-US" sz="2800" dirty="0">
                 <a:latin typeface="Domine" panose="020B0604020202020204" charset="0"/>
               </a:rPr>
-              <a:t>When a significant numerical error repeatedly occurs at a certain portion or point of the trajectory, that place would be interpreted as where the “break” is observed. Further numerical study will be done regarding that location.</a:t>
+              <a:t>When a significant numerical error repeatedly occurs at a certain portion or point of the trajectory, that place would be interpreted as where the “break” is observed. Further numerical study should be done regarding that location.</a:t>
             </a:r>
           </a:p>
         </p:txBody>
@@ -1453,7 +1453,7 @@
         </p:nvSpPr>
         <p:spPr>
           <a:xfrm>
-            <a:off x="32771826" y="18002307"/>
+            <a:off x="32771826" y="17845706"/>
             <a:ext cx="9144000" cy="646331"/>
           </a:xfrm>
           <a:prstGeom prst="rect">
@@ -1713,7 +1713,7 @@
         <p:spPr>
           <a:xfrm>
             <a:off x="1111116" y="14741964"/>
-            <a:ext cx="8971347" cy="16573768"/>
+            <a:ext cx="8971347" cy="16142881"/>
           </a:xfrm>
           <a:prstGeom prst="rect">
             <a:avLst/>
@@ -1758,12 +1758,6 @@
           </a:p>
           <a:p>
             <a:pPr algn="just"/>
-            <a:endParaRPr lang="en-US" sz="2800" dirty="0">
-              <a:latin typeface="Domine" panose="020B0604020202020204" charset="0"/>
-            </a:endParaRPr>
-          </a:p>
-          <a:p>
-            <a:pPr algn="just"/>
             <a:r>
               <a:rPr lang="en-US" sz="2800" dirty="0">
                 <a:latin typeface="Domine" panose="020B0604020202020204" charset="0"/>
@@ -1816,7 +1810,7 @@
               <a:rPr lang="en-US" sz="2800" dirty="0">
                 <a:latin typeface="Domine" panose="020B0604020202020204" charset="0"/>
               </a:rPr>
-              <a:t> is the ball’s angular velocity. (Reference for magnus force term?) This gives us a differential equation of the ball’s acceleration in terms of the ball’s velocity. To solve this equation for position, a numerical estimation script was written in python, using the Runge-</a:t>
+              <a:t> is the ball’s angular velocity. This gives us a differential equation of the ball’s acceleration in terms of the ball’s velocity. To solve this equation for position, a numerical estimation script was written in python, using the Runge-</a:t>
             </a:r>
             <a:r>
               <a:rPr lang="en-US" sz="2800" dirty="0" err="1">
@@ -1843,7 +1837,7 @@
               <a:rPr lang="en-US" sz="2800" dirty="0">
                 <a:latin typeface="Domine" panose="020B0604020202020204" charset="0"/>
               </a:rPr>
-              <a:t>The rest of the simulation scripts were written in a way that the user could configure details such as the pitcher’s arm length, the release point, or the ball’s launch profile. Optimization scripts were written in order to extract the values for the two unknown coefficients from experimental data, both from our own high-speed camera footage and literature studies (reference). </a:t>
+              <a:t>The rest of the simulation scripts were written in a way that the user could configure details such as the pitcher’s arm length, the release point, or the ball’s launch profile. Optimization scripts were written in order to extract the values for the two unknown coefficients from experimental data, both from our own high-speed camera footage and literature studies (Briggs, 1959). </a:t>
             </a:r>
           </a:p>
           <a:p>
@@ -1882,7 +1876,7 @@
               <a:rPr lang="en-US" sz="2800" dirty="0">
                 <a:latin typeface="Domine" panose="020B0604020202020204" charset="0"/>
               </a:rPr>
-              <a:t>For each pitch, one dimensional acceleration along x, y, and z axes were plotted. </a:t>
+              <a:t>For each pitch, one dimensional accelerations along x, y, and z axes were plotted. </a:t>
             </a:r>
           </a:p>
           <a:p>
@@ -1894,7 +1888,7 @@
               <a:rPr lang="en-US" sz="2800" dirty="0">
                 <a:latin typeface="Domine" panose="020B0604020202020204" charset="0"/>
               </a:rPr>
-              <a:t>For each pitch, the acceleration on the </a:t>
+              <a:t>For each pitch, the magnitude of acceleration on the </a:t>
             </a:r>
             <a:r>
               <a:rPr lang="en-US" sz="2800" dirty="0" err="1">
@@ -1906,17 +1900,8 @@
               <a:rPr lang="en-US" sz="2800" dirty="0">
                 <a:latin typeface="Domine" panose="020B0604020202020204" charset="0"/>
               </a:rPr>
-              <a:t> plane was plotted, where the x axis points from the home plate to the pitcher’s mound, and the z axis is vertical. In other words, the three dimensional trajectory of the ball was projected onto a plane parallel to the front of the home plate and perpendicular with </a:t>
-            </a:r>
-            <a:r>
-              <a:rPr lang="en-US" sz="2800">
-                <a:latin typeface="Domine" panose="020B0604020202020204" charset="0"/>
-              </a:rPr>
-              <a:t>the ground.</a:t>
-            </a:r>
-            <a:endParaRPr lang="en-US" sz="2800" dirty="0">
-              <a:latin typeface="Domine" panose="020B0604020202020204" charset="0"/>
-            </a:endParaRPr>
+              <a:t> plane was plotted, where the x axis points from the home plate to the pitcher’s mound, and the z axis is vertical. In other words, the three dimensional trajectory of the ball was projected onto a plane parallel to the front of the home plate and perpendicular with the ground.</a:t>
+            </a:r>
           </a:p>
           <a:p>
             <a:pPr algn="just"/>
@@ -1990,7 +1975,7 @@
         <p:spPr>
           <a:xfrm>
             <a:off x="32442987" y="5102110"/>
-            <a:ext cx="10794296" cy="12161221"/>
+            <a:ext cx="10794296" cy="11892381"/>
           </a:xfrm>
           <a:prstGeom prst="roundRect">
             <a:avLst>
@@ -2048,7 +2033,7 @@
         <p:spPr>
           <a:xfrm>
             <a:off x="32749957" y="6189748"/>
-            <a:ext cx="10256803" cy="11295400"/>
+            <a:ext cx="10256803" cy="10433625"/>
           </a:xfrm>
           <a:prstGeom prst="rect">
             <a:avLst/>
@@ -2085,7 +2070,7 @@
               <a:rPr lang="en-US" sz="2800" dirty="0">
                 <a:latin typeface="Domine" panose="020B0604020202020204" charset="0"/>
               </a:rPr>
-              <a:t>However, it is still noteworthy to take a look at the two dimensional projection of the actual trajectory, as shown in Fig. 3. For a given pitch, each dot in Fig. 3 is 0.02 seconds apart from the closest dot. </a:t>
+              <a:t>However, it is still noteworthy to take a look at the two dimensional projection of the actual trajectory, as shown in Fig. 3. For a given pitch, each dot in Fig. 3 is 0.02 seconds apart from the closest dot. A human batter would observe the ball for approximately 0.2 seconds before starting the swing. In Fig. 3, the batter would therefore see about ten dots before the swing starts. </a:t>
             </a:r>
           </a:p>
           <a:p>
@@ -2093,15 +2078,6 @@
             <a:endParaRPr lang="en-US" sz="2800" dirty="0">
               <a:latin typeface="Domine" panose="020B0604020202020204" charset="0"/>
             </a:endParaRPr>
-          </a:p>
-          <a:p>
-            <a:pPr algn="just"/>
-            <a:r>
-              <a:rPr lang="en-US" sz="2800" dirty="0">
-                <a:latin typeface="Domine" panose="020B0604020202020204" charset="0"/>
-              </a:rPr>
-              <a:t>A human batter would observe the ball for approximately 0.2 seconds before starting the swing. In Fig. 3, the batter would therefore see around ten dots before the swing starts. </a:t>
-            </a:r>
           </a:p>
           <a:p>
             <a:pPr algn="just"/>
@@ -2497,7 +2473,7 @@
         </p:nvSpPr>
         <p:spPr>
           <a:xfrm>
-            <a:off x="16378689" y="5536386"/>
+            <a:off x="15974731" y="5567373"/>
             <a:ext cx="11133821" cy="655293"/>
           </a:xfrm>
           <a:prstGeom prst="rect">
@@ -2782,7 +2758,7 @@
         </p:nvSpPr>
         <p:spPr>
           <a:xfrm>
-            <a:off x="16400035" y="14478544"/>
+            <a:off x="15974731" y="14414317"/>
             <a:ext cx="11133821" cy="655293"/>
           </a:xfrm>
           <a:prstGeom prst="rect">
@@ -2830,8 +2806,8 @@
         </p:nvSpPr>
         <p:spPr>
           <a:xfrm>
-            <a:off x="13096882" y="15238032"/>
-            <a:ext cx="17740126" cy="523220"/>
+            <a:off x="11157353" y="15174778"/>
+            <a:ext cx="20768575" cy="954107"/>
           </a:xfrm>
           <a:prstGeom prst="rect">
             <a:avLst/>
@@ -2849,7 +2825,7 @@
               <a:rPr lang="en-US" sz="2800" dirty="0">
                 <a:latin typeface="Domine" panose="020B0604020202020204" charset="0"/>
               </a:rPr>
-              <a:t>Acceleration magnitude on the batter’s plane of vision of a slider, a fastball, and a curveball.</a:t>
+              <a:t>Magnitude of acceleration on the batter’s plane of vision of a slider, a fastball, and a curveball. Note that although the breaking balls have a decreasing trend due to air drag, the magnitude is much larger compared to the fastball. </a:t>
             </a:r>
           </a:p>
         </p:txBody>
@@ -2992,7 +2968,7 @@
               <a:rPr lang="en-US" sz="2800" dirty="0">
                 <a:latin typeface="Domine" panose="020B0604020202020204" charset="0"/>
               </a:rPr>
-              <a:t>Two dimensional projection of the following three pitches: a fastball, a curveball, and a slider. The red rectangle represents the average size of a strike zone. All three pitches were simulated with the same initial launch angles, where a fastball would land at the center of the strike zone, as seen in the figure. The position of the ball is recorded on the plot every 0.02 seconds for each pitch. </a:t>
+              <a:t>Two dimensional projection of the following three pitches: a fastball, a curveball, and a slider. The red rectangle represents the average size of a strike zone. All three pitches were simulated with the same initial direction of the velocity vector, with which a fastball would land at the center of the strike zone, as seen in the figure. The position of the ball is recorded on the plot every 0.02 seconds for each pitch. </a:t>
             </a:r>
           </a:p>
         </p:txBody>
@@ -3047,8 +3023,8 @@
         </p:nvSpPr>
         <p:spPr>
           <a:xfrm>
-            <a:off x="32450409" y="28350394"/>
-            <a:ext cx="10794296" cy="3392347"/>
+            <a:off x="32450409" y="28331200"/>
+            <a:ext cx="10794296" cy="3411541"/>
           </a:xfrm>
           <a:prstGeom prst="roundRect">
             <a:avLst>
@@ -3106,7 +3082,7 @@
         <p:spPr>
           <a:xfrm>
             <a:off x="32757379" y="29438033"/>
-            <a:ext cx="10256803" cy="523220"/>
+            <a:ext cx="10256803" cy="1815882"/>
           </a:xfrm>
           <a:prstGeom prst="rect">
             <a:avLst/>
@@ -3123,12 +3099,12 @@
             </a:defPPr>
           </a:lstStyle>
           <a:p>
-            <a:pPr algn="just"/>
-            <a:r>
-              <a:rPr lang="en-US" sz="2800" dirty="0">
-                <a:latin typeface="Domine" panose="020B0604020202020204" charset="0"/>
-              </a:rPr>
-              <a:t>words</a:t>
+            <a:pPr marL="457200" indent="-457200" algn="just"/>
+            <a:r>
+              <a:rPr lang="en-US" sz="2800" dirty="0">
+                <a:latin typeface="Domine" panose="020B0604020202020204" charset="0"/>
+              </a:rPr>
+              <a:t>Briggs, L. J. (1959). Effect of Spin and Speed on the Lateral Deflection (Curve) of a Baseball; and the Magnus Effect for Smooth Spheres. American Journal of Physics, 27(8), 589–596. doi: 10.1119/1.1934921 </a:t>
             </a:r>
           </a:p>
         </p:txBody>
@@ -3180,6 +3156,144 @@
           </a:p>
         </p:txBody>
       </p:sp>
+      <p:pic>
+        <p:nvPicPr>
+          <p:cNvPr id="2" name="Picture 1">
+            <a:extLst>
+              <a:ext uri="{FF2B5EF4-FFF2-40B4-BE49-F238E27FC236}">
+                <a16:creationId xmlns:a16="http://schemas.microsoft.com/office/drawing/2014/main" id="{AC6A09AB-ADEF-4557-BF64-9DAF6186F096}"/>
+              </a:ext>
+            </a:extLst>
+          </p:cNvPr>
+          <p:cNvPicPr>
+            <a:picLocks noChangeAspect="1"/>
+          </p:cNvPicPr>
+          <p:nvPr/>
+        </p:nvPicPr>
+        <p:blipFill>
+          <a:blip r:embed="rId6"/>
+          <a:stretch>
+            <a:fillRect/>
+          </a:stretch>
+        </p:blipFill>
+        <p:spPr>
+          <a:xfrm>
+            <a:off x="1976143" y="15796250"/>
+            <a:ext cx="7217229" cy="811405"/>
+          </a:xfrm>
+          <a:prstGeom prst="rect">
+            <a:avLst/>
+          </a:prstGeom>
+        </p:spPr>
+      </p:pic>
+      <p:pic>
+        <p:nvPicPr>
+          <p:cNvPr id="4" name="Picture 3">
+            <a:extLst>
+              <a:ext uri="{FF2B5EF4-FFF2-40B4-BE49-F238E27FC236}">
+                <a16:creationId xmlns:a16="http://schemas.microsoft.com/office/drawing/2014/main" id="{639A3E16-2868-479F-B3A5-293EDE16DAD6}"/>
+              </a:ext>
+            </a:extLst>
+          </p:cNvPr>
+          <p:cNvPicPr>
+            <a:picLocks noChangeAspect="1"/>
+          </p:cNvPicPr>
+          <p:nvPr/>
+        </p:nvPicPr>
+        <p:blipFill>
+          <a:blip r:embed="rId7">
+            <a:extLst>
+              <a:ext uri="{28A0092B-C50C-407E-A947-70E740481C1C}">
+                <a14:useLocalDpi xmlns:a14="http://schemas.microsoft.com/office/drawing/2010/main" val="0"/>
+              </a:ext>
+            </a:extLst>
+          </a:blip>
+          <a:stretch>
+            <a:fillRect/>
+          </a:stretch>
+        </p:blipFill>
+        <p:spPr>
+          <a:xfrm>
+            <a:off x="11380627" y="16347961"/>
+            <a:ext cx="6423391" cy="4817543"/>
+          </a:xfrm>
+          <a:prstGeom prst="rect">
+            <a:avLst/>
+          </a:prstGeom>
+        </p:spPr>
+      </p:pic>
+      <p:pic>
+        <p:nvPicPr>
+          <p:cNvPr id="6" name="Picture 5">
+            <a:extLst>
+              <a:ext uri="{FF2B5EF4-FFF2-40B4-BE49-F238E27FC236}">
+                <a16:creationId xmlns:a16="http://schemas.microsoft.com/office/drawing/2014/main" id="{0BFB3C4A-FF0C-444E-A1D8-46DB36145714}"/>
+              </a:ext>
+            </a:extLst>
+          </p:cNvPr>
+          <p:cNvPicPr>
+            <a:picLocks noChangeAspect="1"/>
+          </p:cNvPicPr>
+          <p:nvPr/>
+        </p:nvPicPr>
+        <p:blipFill>
+          <a:blip r:embed="rId8">
+            <a:extLst>
+              <a:ext uri="{28A0092B-C50C-407E-A947-70E740481C1C}">
+                <a14:useLocalDpi xmlns:a14="http://schemas.microsoft.com/office/drawing/2010/main" val="0"/>
+              </a:ext>
+            </a:extLst>
+          </a:blip>
+          <a:stretch>
+            <a:fillRect/>
+          </a:stretch>
+        </p:blipFill>
+        <p:spPr>
+          <a:xfrm>
+            <a:off x="18182669" y="16350452"/>
+            <a:ext cx="6468343" cy="4851257"/>
+          </a:xfrm>
+          <a:prstGeom prst="rect">
+            <a:avLst/>
+          </a:prstGeom>
+        </p:spPr>
+      </p:pic>
+      <p:pic>
+        <p:nvPicPr>
+          <p:cNvPr id="8" name="Picture 7">
+            <a:extLst>
+              <a:ext uri="{FF2B5EF4-FFF2-40B4-BE49-F238E27FC236}">
+                <a16:creationId xmlns:a16="http://schemas.microsoft.com/office/drawing/2014/main" id="{CF4333DD-C5E5-4DC1-A3A2-5769C4CF43F6}"/>
+              </a:ext>
+            </a:extLst>
+          </p:cNvPr>
+          <p:cNvPicPr>
+            <a:picLocks noChangeAspect="1"/>
+          </p:cNvPicPr>
+          <p:nvPr/>
+        </p:nvPicPr>
+        <p:blipFill>
+          <a:blip r:embed="rId9">
+            <a:extLst>
+              <a:ext uri="{28A0092B-C50C-407E-A947-70E740481C1C}">
+                <a14:useLocalDpi xmlns:a14="http://schemas.microsoft.com/office/drawing/2010/main" val="0"/>
+              </a:ext>
+            </a:extLst>
+          </a:blip>
+          <a:stretch>
+            <a:fillRect/>
+          </a:stretch>
+        </p:blipFill>
+        <p:spPr>
+          <a:xfrm>
+            <a:off x="25161657" y="16384166"/>
+            <a:ext cx="6423391" cy="4817543"/>
+          </a:xfrm>
+          <a:prstGeom prst="rect">
+            <a:avLst/>
+          </a:prstGeom>
+        </p:spPr>
+      </p:pic>
     </p:spTree>
     <p:extLst>
       <p:ext uri="{BB962C8B-B14F-4D97-AF65-F5344CB8AC3E}">

</xml_diff>

<commit_message>
Fixed a typo on the poster
</commit_message>
<xml_diff>
--- a/poster/Poster.pptx
+++ b/poster/Poster.pptx
@@ -247,7 +247,7 @@
           <a:p>
             <a:fld id="{7B0E8FA9-8B5F-4493-A208-FBBD06A1EBF4}" type="datetimeFigureOut">
               <a:rPr lang="en-US" smtClean="0"/>
-              <a:t>5/20/2020</a:t>
+              <a:t>5/21/2020</a:t>
             </a:fld>
             <a:endParaRPr lang="en-US"/>
           </a:p>
@@ -2930,7 +2930,7 @@
                 </a:solidFill>
                 <a:latin typeface="Montserrat Extra Bold" panose="00000900000000000000" pitchFamily="50" charset="0"/>
               </a:rPr>
-              <a:t>Figure 2</a:t>
+              <a:t>Figure 3</a:t>
             </a:r>
           </a:p>
         </p:txBody>

</xml_diff>